<commit_message>
update direct mpki and indirect mpki
</commit_message>
<xml_diff>
--- a/graph.pptx
+++ b/graph.pptx
@@ -215,335 +215,185 @@
           <c:invertIfNegative val="0"/>
           <c:cat>
             <c:strRef>
-              <c:f>Sheet1!$A$2:$A$54</c:f>
+              <c:f>Sheet1!$A$2:$A$29</c:f>
               <c:strCache>
-                <c:ptCount val="53"/>
+                <c:ptCount val="28"/>
                 <c:pt idx="0">
+                  <c:v>bzip2</c:v>
+                </c:pt>
+                <c:pt idx="1">
+                  <c:v>perlbench</c:v>
+                </c:pt>
+                <c:pt idx="2">
+                  <c:v>omnetpp</c:v>
+                </c:pt>
+                <c:pt idx="3">
+                  <c:v>calculix</c:v>
+                </c:pt>
+                <c:pt idx="4">
+                  <c:v>gobmk</c:v>
+                </c:pt>
+                <c:pt idx="5">
+                  <c:v>gcc</c:v>
+                </c:pt>
+                <c:pt idx="6">
+                  <c:v>zeusmp</c:v>
+                </c:pt>
+                <c:pt idx="7">
+                  <c:v>bwaves</c:v>
+                </c:pt>
+                <c:pt idx="8">
+                  <c:v>tonto</c:v>
+                </c:pt>
+                <c:pt idx="9">
+                  <c:v>gromacs</c:v>
+                </c:pt>
+                <c:pt idx="10">
+                  <c:v>astar</c:v>
+                </c:pt>
+                <c:pt idx="11">
+                  <c:v>cactusADM</c:v>
+                </c:pt>
+                <c:pt idx="12">
+                  <c:v>xalancbmk</c:v>
+                </c:pt>
+                <c:pt idx="13">
+                  <c:v>gamess</c:v>
+                </c:pt>
+                <c:pt idx="14">
+                  <c:v>sphinx3</c:v>
+                </c:pt>
+                <c:pt idx="15">
+                  <c:v>milc</c:v>
+                </c:pt>
+                <c:pt idx="16">
+                  <c:v>soplex</c:v>
+                </c:pt>
+                <c:pt idx="17">
+                  <c:v>povray</c:v>
+                </c:pt>
+                <c:pt idx="18">
+                  <c:v>hmmer</c:v>
+                </c:pt>
+                <c:pt idx="19">
+                  <c:v>sjeng</c:v>
+                </c:pt>
+                <c:pt idx="20">
+                  <c:v>libquantum</c:v>
+                </c:pt>
+                <c:pt idx="21">
+                  <c:v>leslie3d</c:v>
+                </c:pt>
+                <c:pt idx="22">
+                  <c:v>wrf</c:v>
+                </c:pt>
+                <c:pt idx="23">
+                  <c:v>namd</c:v>
+                </c:pt>
+                <c:pt idx="24">
                   <c:v>GemsFDTD</c:v>
                 </c:pt>
-                <c:pt idx="1">
-                  <c:v>perlbench_diffmail</c:v>
-                </c:pt>
-                <c:pt idx="2">
-                  <c:v>astar_biglakes</c:v>
-                </c:pt>
-                <c:pt idx="3">
-                  <c:v>bwaves</c:v>
-                </c:pt>
-                <c:pt idx="4">
-                  <c:v>soplex_ref</c:v>
-                </c:pt>
-                <c:pt idx="5">
-                  <c:v>omnetpp</c:v>
-                </c:pt>
-                <c:pt idx="6">
-                  <c:v>gobmk_score2</c:v>
-                </c:pt>
-                <c:pt idx="7">
-                  <c:v>hmmer_retro</c:v>
-                </c:pt>
-                <c:pt idx="8">
-                  <c:v>namd</c:v>
-                </c:pt>
-                <c:pt idx="9">
+                <c:pt idx="25">
+                  <c:v>dealII</c:v>
+                </c:pt>
+                <c:pt idx="26">
                   <c:v>lbm</c:v>
                 </c:pt>
-                <c:pt idx="10">
-                  <c:v>perlbench_splitmail</c:v>
-                </c:pt>
-                <c:pt idx="11">
-                  <c:v>gcc_scilab</c:v>
-                </c:pt>
-                <c:pt idx="12">
-                  <c:v>libquantum</c:v>
-                </c:pt>
-                <c:pt idx="13">
-                  <c:v>cactusADM</c:v>
-                </c:pt>
-                <c:pt idx="14">
-                  <c:v>gcc_166</c:v>
-                </c:pt>
-                <c:pt idx="15">
-                  <c:v>xalancbmk</c:v>
-                </c:pt>
-                <c:pt idx="16">
-                  <c:v>gamess_gradient</c:v>
-                </c:pt>
-                <c:pt idx="17">
-                  <c:v>gcc_s04</c:v>
-                </c:pt>
-                <c:pt idx="18">
-                  <c:v>gobmk_nngs</c:v>
-                </c:pt>
-                <c:pt idx="19">
-                  <c:v>gobmk_trevord</c:v>
-                </c:pt>
-                <c:pt idx="20">
-                  <c:v>h264ref_foreman</c:v>
-                </c:pt>
-                <c:pt idx="21">
-                  <c:v>gamess_triazolium</c:v>
-                </c:pt>
-                <c:pt idx="22">
-                  <c:v>hmmer_nph3</c:v>
-                </c:pt>
-                <c:pt idx="23">
-                  <c:v>bzip2_combined</c:v>
-                </c:pt>
-                <c:pt idx="24">
-                  <c:v>bzip2_html</c:v>
-                </c:pt>
-                <c:pt idx="25">
-                  <c:v>gromacs</c:v>
-                </c:pt>
-                <c:pt idx="26">
-                  <c:v>bzip2_chicken</c:v>
-                </c:pt>
                 <c:pt idx="27">
-                  <c:v>gcc_expr</c:v>
-                </c:pt>
-                <c:pt idx="28">
-                  <c:v>astar_rivers</c:v>
-                </c:pt>
-                <c:pt idx="29">
-                  <c:v>tonto</c:v>
-                </c:pt>
-                <c:pt idx="30">
-                  <c:v>leslie3d</c:v>
-                </c:pt>
-                <c:pt idx="31">
-                  <c:v>gcc_cpdecl</c:v>
-                </c:pt>
-                <c:pt idx="32">
-                  <c:v>gamess_cytosine</c:v>
-                </c:pt>
-                <c:pt idx="33">
-                  <c:v>bzip2_program</c:v>
-                </c:pt>
-                <c:pt idx="34">
-                  <c:v>milc</c:v>
-                </c:pt>
-                <c:pt idx="35">
-                  <c:v>sjeng</c:v>
-                </c:pt>
-                <c:pt idx="36">
-                  <c:v>gcc_200</c:v>
-                </c:pt>
-                <c:pt idx="37">
-                  <c:v>gcc_g23</c:v>
-                </c:pt>
-                <c:pt idx="38">
-                  <c:v>mcf</c:v>
-                </c:pt>
-                <c:pt idx="39">
-                  <c:v>zeusmp</c:v>
-                </c:pt>
-                <c:pt idx="40">
-                  <c:v>bzip2_liberty</c:v>
-                </c:pt>
-                <c:pt idx="41">
-                  <c:v>povray</c:v>
-                </c:pt>
-                <c:pt idx="42">
-                  <c:v>sphinx3</c:v>
-                </c:pt>
-                <c:pt idx="43">
-                  <c:v>gcc_expr2</c:v>
-                </c:pt>
-                <c:pt idx="44">
-                  <c:v>dealII</c:v>
-                </c:pt>
-                <c:pt idx="45">
-                  <c:v>bzip2_source</c:v>
-                </c:pt>
-                <c:pt idx="46">
-                  <c:v>h264ref_sss</c:v>
-                </c:pt>
-                <c:pt idx="47">
-                  <c:v>gobmk_13x13</c:v>
-                </c:pt>
-                <c:pt idx="48">
-                  <c:v>soplex_pds</c:v>
-                </c:pt>
-                <c:pt idx="49">
-                  <c:v>gobmk_trevorc</c:v>
-                </c:pt>
-                <c:pt idx="50">
-                  <c:v>gcc_typeck</c:v>
-                </c:pt>
-                <c:pt idx="51">
-                  <c:v>calculix</c:v>
-                </c:pt>
-                <c:pt idx="52">
-                  <c:v>perlbench_checkspam</c:v>
+                  <c:v>h264ref</c:v>
                 </c:pt>
               </c:strCache>
             </c:strRef>
           </c:cat>
           <c:val>
             <c:numRef>
-              <c:f>Sheet1!$B$2:$B$54</c:f>
+              <c:f>Sheet1!$B$2:$B$29</c:f>
               <c:numCache>
                 <c:formatCode>General</c:formatCode>
-                <c:ptCount val="53"/>
+                <c:ptCount val="28"/>
                 <c:pt idx="0">
+                  <c:v>8.7937436967444196</c:v>
+                </c:pt>
+                <c:pt idx="1">
+                  <c:v>1.92095677396165</c:v>
+                </c:pt>
+                <c:pt idx="2">
+                  <c:v>5.97</c:v>
+                </c:pt>
+                <c:pt idx="3">
+                  <c:v>6.1122976000000002E-2</c:v>
+                </c:pt>
+                <c:pt idx="4">
+                  <c:v>16.577952456234399</c:v>
+                </c:pt>
+                <c:pt idx="5">
+                  <c:v>2.0202120439019602</c:v>
+                </c:pt>
+                <c:pt idx="6">
+                  <c:v>3.4646858000000002E-3</c:v>
+                </c:pt>
+                <c:pt idx="7">
+                  <c:v>9.9999989999999999E-4</c:v>
+                </c:pt>
+                <c:pt idx="8">
+                  <c:v>0.40822464000000003</c:v>
+                </c:pt>
+                <c:pt idx="9">
+                  <c:v>2.2446654000000001</c:v>
+                </c:pt>
+                <c:pt idx="10">
+                  <c:v>14.6396540295038</c:v>
+                </c:pt>
+                <c:pt idx="11">
+                  <c:v>2.1999999999999999E-2</c:v>
+                </c:pt>
+                <c:pt idx="12">
+                  <c:v>2.0359492000000001</c:v>
+                </c:pt>
+                <c:pt idx="13">
+                  <c:v>0.37707385008215399</c:v>
+                </c:pt>
+                <c:pt idx="14">
+                  <c:v>2.6845734000000001</c:v>
+                </c:pt>
+                <c:pt idx="15">
+                  <c:v>1.8240076000000001E-2</c:v>
+                </c:pt>
+                <c:pt idx="16">
+                  <c:v>9.7720938945511406</c:v>
+                </c:pt>
+                <c:pt idx="17">
+                  <c:v>1.0478272</c:v>
+                </c:pt>
+                <c:pt idx="18">
+                  <c:v>16.305893322065</c:v>
+                </c:pt>
+                <c:pt idx="19">
+                  <c:v>8.4827779999999997</c:v>
+                </c:pt>
+                <c:pt idx="20">
+                  <c:v>8.0504279999999998E-2</c:v>
+                </c:pt>
+                <c:pt idx="21">
+                  <c:v>1.2837596999999999E-2</c:v>
+                </c:pt>
+                <c:pt idx="22">
+                  <c:v>0</c:v>
+                </c:pt>
+                <c:pt idx="23">
+                  <c:v>2.6316147000000001</c:v>
+                </c:pt>
+                <c:pt idx="24">
                   <c:v>2.8337251000000001E-2</c:v>
                 </c:pt>
-                <c:pt idx="1">
-                  <c:v>0.55899995999999996</c:v>
-                </c:pt>
-                <c:pt idx="2">
-                  <c:v>8.2114370000000001</c:v>
-                </c:pt>
-                <c:pt idx="3">
-                  <c:v>9.9999989999999999E-4</c:v>
-                </c:pt>
-                <c:pt idx="4">
-                  <c:v>4.3677210000000004</c:v>
-                </c:pt>
-                <c:pt idx="5">
-                  <c:v>5.97</c:v>
-                </c:pt>
-                <c:pt idx="6">
-                  <c:v>15.338768</c:v>
-                </c:pt>
-                <c:pt idx="7">
-                  <c:v>16.65258</c:v>
-                </c:pt>
-                <c:pt idx="8">
-                  <c:v>2.6316147000000001</c:v>
-                </c:pt>
-                <c:pt idx="9">
+                <c:pt idx="25">
+                  <c:v>1.0966834000000001</c:v>
+                </c:pt>
+                <c:pt idx="26">
                   <c:v>7.3999990000000002E-2</c:v>
                 </c:pt>
-                <c:pt idx="10">
-                  <c:v>0.81695485000000001</c:v>
-                </c:pt>
-                <c:pt idx="11">
-                  <c:v>5.953068</c:v>
-                </c:pt>
-                <c:pt idx="12">
-                  <c:v>8.0504279999999998E-2</c:v>
-                </c:pt>
-                <c:pt idx="13">
-                  <c:v>2.1999999999999999E-2</c:v>
-                </c:pt>
-                <c:pt idx="14">
-                  <c:v>1.3577002</c:v>
-                </c:pt>
-                <c:pt idx="15">
-                  <c:v>2.0359492000000001</c:v>
-                </c:pt>
-                <c:pt idx="16">
-                  <c:v>0.31978879999999998</c:v>
-                </c:pt>
-                <c:pt idx="17">
-                  <c:v>1.2309068000000001</c:v>
-                </c:pt>
-                <c:pt idx="18">
-                  <c:v>15.728104</c:v>
-                </c:pt>
-                <c:pt idx="19">
-                  <c:v>15.701649</c:v>
-                </c:pt>
-                <c:pt idx="20">
-                  <c:v>1.330173</c:v>
-                </c:pt>
-                <c:pt idx="21">
-                  <c:v>0.23608080000000001</c:v>
-                </c:pt>
-                <c:pt idx="22">
-                  <c:v>15.574445000000001</c:v>
-                </c:pt>
-                <c:pt idx="23">
-                  <c:v>14.048555</c:v>
-                </c:pt>
-                <c:pt idx="24">
-                  <c:v>5.6446430000000003</c:v>
-                </c:pt>
-                <c:pt idx="25">
-                  <c:v>2.2446654000000001</c:v>
-                </c:pt>
-                <c:pt idx="26">
-                  <c:v>5.5838264999999998</c:v>
-                </c:pt>
                 <c:pt idx="27">
-                  <c:v>0.12729190000000001</c:v>
-                </c:pt>
-                <c:pt idx="28">
-                  <c:v>17.711945</c:v>
-                </c:pt>
-                <c:pt idx="29">
-                  <c:v>0.40822464000000003</c:v>
-                </c:pt>
-                <c:pt idx="30">
-                  <c:v>1.2837596999999999E-2</c:v>
-                </c:pt>
-                <c:pt idx="31">
-                  <c:v>1.4152948000000001</c:v>
-                </c:pt>
-                <c:pt idx="32">
-                  <c:v>0.60887146000000003</c:v>
-                </c:pt>
-                <c:pt idx="33">
-                  <c:v>9.0580409999999993</c:v>
-                </c:pt>
-                <c:pt idx="34">
-                  <c:v>1.8240076000000001E-2</c:v>
-                </c:pt>
-                <c:pt idx="35">
-                  <c:v>8.4827779999999997</c:v>
-                </c:pt>
-                <c:pt idx="36">
-                  <c:v>5.3595499999999996</c:v>
-                </c:pt>
-                <c:pt idx="37">
-                  <c:v>0.42937123999999999</c:v>
-                </c:pt>
-                <c:pt idx="38">
-                  <c:v>22.160806999999998</c:v>
-                </c:pt>
-                <c:pt idx="39">
-                  <c:v>3.4646858000000002E-3</c:v>
-                </c:pt>
-                <c:pt idx="40">
-                  <c:v>3.2733561999999998</c:v>
-                </c:pt>
-                <c:pt idx="41">
-                  <c:v>1.0478272</c:v>
-                </c:pt>
-                <c:pt idx="42">
-                  <c:v>2.6845734000000001</c:v>
-                </c:pt>
-                <c:pt idx="43">
-                  <c:v>2.2909293000000002</c:v>
-                </c:pt>
-                <c:pt idx="44">
-                  <c:v>1.0966834000000001</c:v>
-                </c:pt>
-                <c:pt idx="45">
-                  <c:v>14.502991</c:v>
-                </c:pt>
-                <c:pt idx="46">
-                  <c:v>0.80999770000000004</c:v>
-                </c:pt>
-                <c:pt idx="47">
-                  <c:v>20.544138</c:v>
-                </c:pt>
-                <c:pt idx="48">
-                  <c:v>15.04987</c:v>
-                </c:pt>
-                <c:pt idx="49">
-                  <c:v>17.813139</c:v>
-                </c:pt>
-                <c:pt idx="50">
-                  <c:v>1.9197934999999999</c:v>
-                </c:pt>
-                <c:pt idx="51">
-                  <c:v>6.1122976000000002E-2</c:v>
-                </c:pt>
-                <c:pt idx="52">
-                  <c:v>3.0746609999999999</c:v>
+                  <c:v>0.86127556420149098</c:v>
                 </c:pt>
               </c:numCache>
             </c:numRef>
@@ -580,335 +430,185 @@
           <c:invertIfNegative val="0"/>
           <c:cat>
             <c:strRef>
-              <c:f>Sheet1!$A$2:$A$54</c:f>
+              <c:f>Sheet1!$A$2:$A$29</c:f>
               <c:strCache>
-                <c:ptCount val="53"/>
+                <c:ptCount val="28"/>
                 <c:pt idx="0">
+                  <c:v>bzip2</c:v>
+                </c:pt>
+                <c:pt idx="1">
+                  <c:v>perlbench</c:v>
+                </c:pt>
+                <c:pt idx="2">
+                  <c:v>omnetpp</c:v>
+                </c:pt>
+                <c:pt idx="3">
+                  <c:v>calculix</c:v>
+                </c:pt>
+                <c:pt idx="4">
+                  <c:v>gobmk</c:v>
+                </c:pt>
+                <c:pt idx="5">
+                  <c:v>gcc</c:v>
+                </c:pt>
+                <c:pt idx="6">
+                  <c:v>zeusmp</c:v>
+                </c:pt>
+                <c:pt idx="7">
+                  <c:v>bwaves</c:v>
+                </c:pt>
+                <c:pt idx="8">
+                  <c:v>tonto</c:v>
+                </c:pt>
+                <c:pt idx="9">
+                  <c:v>gromacs</c:v>
+                </c:pt>
+                <c:pt idx="10">
+                  <c:v>astar</c:v>
+                </c:pt>
+                <c:pt idx="11">
+                  <c:v>cactusADM</c:v>
+                </c:pt>
+                <c:pt idx="12">
+                  <c:v>xalancbmk</c:v>
+                </c:pt>
+                <c:pt idx="13">
+                  <c:v>gamess</c:v>
+                </c:pt>
+                <c:pt idx="14">
+                  <c:v>sphinx3</c:v>
+                </c:pt>
+                <c:pt idx="15">
+                  <c:v>milc</c:v>
+                </c:pt>
+                <c:pt idx="16">
+                  <c:v>soplex</c:v>
+                </c:pt>
+                <c:pt idx="17">
+                  <c:v>povray</c:v>
+                </c:pt>
+                <c:pt idx="18">
+                  <c:v>hmmer</c:v>
+                </c:pt>
+                <c:pt idx="19">
+                  <c:v>sjeng</c:v>
+                </c:pt>
+                <c:pt idx="20">
+                  <c:v>libquantum</c:v>
+                </c:pt>
+                <c:pt idx="21">
+                  <c:v>leslie3d</c:v>
+                </c:pt>
+                <c:pt idx="22">
+                  <c:v>wrf</c:v>
+                </c:pt>
+                <c:pt idx="23">
+                  <c:v>namd</c:v>
+                </c:pt>
+                <c:pt idx="24">
                   <c:v>GemsFDTD</c:v>
                 </c:pt>
-                <c:pt idx="1">
-                  <c:v>perlbench_diffmail</c:v>
-                </c:pt>
-                <c:pt idx="2">
-                  <c:v>astar_biglakes</c:v>
-                </c:pt>
-                <c:pt idx="3">
-                  <c:v>bwaves</c:v>
-                </c:pt>
-                <c:pt idx="4">
-                  <c:v>soplex_ref</c:v>
-                </c:pt>
-                <c:pt idx="5">
-                  <c:v>omnetpp</c:v>
-                </c:pt>
-                <c:pt idx="6">
-                  <c:v>gobmk_score2</c:v>
-                </c:pt>
-                <c:pt idx="7">
-                  <c:v>hmmer_retro</c:v>
-                </c:pt>
-                <c:pt idx="8">
-                  <c:v>namd</c:v>
-                </c:pt>
-                <c:pt idx="9">
+                <c:pt idx="25">
+                  <c:v>dealII</c:v>
+                </c:pt>
+                <c:pt idx="26">
                   <c:v>lbm</c:v>
                 </c:pt>
-                <c:pt idx="10">
-                  <c:v>perlbench_splitmail</c:v>
-                </c:pt>
-                <c:pt idx="11">
-                  <c:v>gcc_scilab</c:v>
-                </c:pt>
-                <c:pt idx="12">
-                  <c:v>libquantum</c:v>
-                </c:pt>
-                <c:pt idx="13">
-                  <c:v>cactusADM</c:v>
-                </c:pt>
-                <c:pt idx="14">
-                  <c:v>gcc_166</c:v>
-                </c:pt>
-                <c:pt idx="15">
-                  <c:v>xalancbmk</c:v>
-                </c:pt>
-                <c:pt idx="16">
-                  <c:v>gamess_gradient</c:v>
-                </c:pt>
-                <c:pt idx="17">
-                  <c:v>gcc_s04</c:v>
-                </c:pt>
-                <c:pt idx="18">
-                  <c:v>gobmk_nngs</c:v>
-                </c:pt>
-                <c:pt idx="19">
-                  <c:v>gobmk_trevord</c:v>
-                </c:pt>
-                <c:pt idx="20">
-                  <c:v>h264ref_foreman</c:v>
-                </c:pt>
-                <c:pt idx="21">
-                  <c:v>gamess_triazolium</c:v>
-                </c:pt>
-                <c:pt idx="22">
-                  <c:v>hmmer_nph3</c:v>
-                </c:pt>
-                <c:pt idx="23">
-                  <c:v>bzip2_combined</c:v>
-                </c:pt>
-                <c:pt idx="24">
-                  <c:v>bzip2_html</c:v>
-                </c:pt>
-                <c:pt idx="25">
-                  <c:v>gromacs</c:v>
-                </c:pt>
-                <c:pt idx="26">
-                  <c:v>bzip2_chicken</c:v>
-                </c:pt>
                 <c:pt idx="27">
-                  <c:v>gcc_expr</c:v>
-                </c:pt>
-                <c:pt idx="28">
-                  <c:v>astar_rivers</c:v>
-                </c:pt>
-                <c:pt idx="29">
-                  <c:v>tonto</c:v>
-                </c:pt>
-                <c:pt idx="30">
-                  <c:v>leslie3d</c:v>
-                </c:pt>
-                <c:pt idx="31">
-                  <c:v>gcc_cpdecl</c:v>
-                </c:pt>
-                <c:pt idx="32">
-                  <c:v>gamess_cytosine</c:v>
-                </c:pt>
-                <c:pt idx="33">
-                  <c:v>bzip2_program</c:v>
-                </c:pt>
-                <c:pt idx="34">
-                  <c:v>milc</c:v>
-                </c:pt>
-                <c:pt idx="35">
-                  <c:v>sjeng</c:v>
-                </c:pt>
-                <c:pt idx="36">
-                  <c:v>gcc_200</c:v>
-                </c:pt>
-                <c:pt idx="37">
-                  <c:v>gcc_g23</c:v>
-                </c:pt>
-                <c:pt idx="38">
-                  <c:v>mcf</c:v>
-                </c:pt>
-                <c:pt idx="39">
-                  <c:v>zeusmp</c:v>
-                </c:pt>
-                <c:pt idx="40">
-                  <c:v>bzip2_liberty</c:v>
-                </c:pt>
-                <c:pt idx="41">
-                  <c:v>povray</c:v>
-                </c:pt>
-                <c:pt idx="42">
-                  <c:v>sphinx3</c:v>
-                </c:pt>
-                <c:pt idx="43">
-                  <c:v>gcc_expr2</c:v>
-                </c:pt>
-                <c:pt idx="44">
-                  <c:v>dealII</c:v>
-                </c:pt>
-                <c:pt idx="45">
-                  <c:v>bzip2_source</c:v>
-                </c:pt>
-                <c:pt idx="46">
-                  <c:v>h264ref_sss</c:v>
-                </c:pt>
-                <c:pt idx="47">
-                  <c:v>gobmk_13x13</c:v>
-                </c:pt>
-                <c:pt idx="48">
-                  <c:v>soplex_pds</c:v>
-                </c:pt>
-                <c:pt idx="49">
-                  <c:v>gobmk_trevorc</c:v>
-                </c:pt>
-                <c:pt idx="50">
-                  <c:v>gcc_typeck</c:v>
-                </c:pt>
-                <c:pt idx="51">
-                  <c:v>calculix</c:v>
-                </c:pt>
-                <c:pt idx="52">
-                  <c:v>perlbench_checkspam</c:v>
+                  <c:v>h264ref</c:v>
                 </c:pt>
               </c:strCache>
             </c:strRef>
           </c:cat>
           <c:val>
             <c:numRef>
-              <c:f>Sheet1!$C$2:$C$54</c:f>
+              <c:f>Sheet1!$C$2:$C$29</c:f>
               <c:numCache>
                 <c:formatCode>General</c:formatCode>
-                <c:ptCount val="53"/>
+                <c:ptCount val="28"/>
                 <c:pt idx="0">
+                  <c:v>6.2648258719263099</c:v>
+                </c:pt>
+                <c:pt idx="1">
+                  <c:v>2.1224913418300599</c:v>
+                </c:pt>
+                <c:pt idx="2">
+                  <c:v>5.7130000000000001</c:v>
+                </c:pt>
+                <c:pt idx="3">
+                  <c:v>0.35557538</c:v>
+                </c:pt>
+                <c:pt idx="4">
+                  <c:v>14.0367353103584</c:v>
+                </c:pt>
+                <c:pt idx="5">
+                  <c:v>1.9191761071608</c:v>
+                </c:pt>
+                <c:pt idx="6">
+                  <c:v>4.4084564E-2</c:v>
+                </c:pt>
+                <c:pt idx="7">
+                  <c:v>9.8000000000000004E-2</c:v>
+                </c:pt>
+                <c:pt idx="8">
+                  <c:v>0.66901140000000003</c:v>
+                </c:pt>
+                <c:pt idx="9">
+                  <c:v>1.6678227000000001</c:v>
+                </c:pt>
+                <c:pt idx="10">
+                  <c:v>13.612296545559101</c:v>
+                </c:pt>
+                <c:pt idx="11">
+                  <c:v>5.0000000000000001E-3</c:v>
+                </c:pt>
+                <c:pt idx="12">
+                  <c:v>1.7087971</c:v>
+                </c:pt>
+                <c:pt idx="13">
+                  <c:v>0.700574857917028</c:v>
+                </c:pt>
+                <c:pt idx="14">
+                  <c:v>2.2179918000000001</c:v>
+                </c:pt>
+                <c:pt idx="15">
+                  <c:v>7.5165436000000002E-2</c:v>
+                </c:pt>
+                <c:pt idx="16">
+                  <c:v>7.3765323000232801</c:v>
+                </c:pt>
+                <c:pt idx="17">
+                  <c:v>1.9036674</c:v>
+                </c:pt>
+                <c:pt idx="18">
+                  <c:v>14.1668442349853</c:v>
+                </c:pt>
+                <c:pt idx="19">
+                  <c:v>7.4587700000000003</c:v>
+                </c:pt>
+                <c:pt idx="20">
+                  <c:v>1.9407483E-2</c:v>
+                </c:pt>
+                <c:pt idx="21">
+                  <c:v>5.4610956000000002E-2</c:v>
+                </c:pt>
+                <c:pt idx="22">
+                  <c:v>0</c:v>
+                </c:pt>
+                <c:pt idx="23">
+                  <c:v>1.8955476</c:v>
+                </c:pt>
+                <c:pt idx="24">
                   <c:v>0.111848034</c:v>
                 </c:pt>
-                <c:pt idx="1">
-                  <c:v>0.80100000000000005</c:v>
-                </c:pt>
-                <c:pt idx="2">
-                  <c:v>8.9497269999999993</c:v>
-                </c:pt>
-                <c:pt idx="3">
-                  <c:v>9.8000000000000004E-2</c:v>
-                </c:pt>
-                <c:pt idx="4">
-                  <c:v>3.8495729999999999</c:v>
-                </c:pt>
-                <c:pt idx="5">
-                  <c:v>5.7130000000000001</c:v>
-                </c:pt>
-                <c:pt idx="6">
-                  <c:v>13.2236595</c:v>
-                </c:pt>
-                <c:pt idx="7">
-                  <c:v>14.405811999999999</c:v>
-                </c:pt>
-                <c:pt idx="8">
-                  <c:v>1.8955476</c:v>
-                </c:pt>
-                <c:pt idx="9">
+                <c:pt idx="25">
+                  <c:v>0.83524719999999997</c:v>
+                </c:pt>
+                <c:pt idx="26">
                   <c:v>4.7999997000000003E-2</c:v>
                 </c:pt>
-                <c:pt idx="10">
-                  <c:v>1.0328774000000001</c:v>
-                </c:pt>
-                <c:pt idx="11">
-                  <c:v>3.2896771</c:v>
-                </c:pt>
-                <c:pt idx="12">
-                  <c:v>1.9407483E-2</c:v>
-                </c:pt>
-                <c:pt idx="13">
-                  <c:v>5.0000000000000001E-3</c:v>
-                </c:pt>
-                <c:pt idx="14">
-                  <c:v>1.6090914999999999</c:v>
-                </c:pt>
-                <c:pt idx="15">
-                  <c:v>1.7087971</c:v>
-                </c:pt>
-                <c:pt idx="16">
-                  <c:v>0.56511056000000004</c:v>
-                </c:pt>
-                <c:pt idx="17">
-                  <c:v>1.4525151999999999</c:v>
-                </c:pt>
-                <c:pt idx="18">
-                  <c:v>13.746771000000001</c:v>
-                </c:pt>
-                <c:pt idx="19">
-                  <c:v>12.942622</c:v>
-                </c:pt>
-                <c:pt idx="20">
-                  <c:v>1.2317967000000001</c:v>
-                </c:pt>
-                <c:pt idx="21">
-                  <c:v>0.38604369999999999</c:v>
-                </c:pt>
-                <c:pt idx="22">
-                  <c:v>13.662663999999999</c:v>
-                </c:pt>
-                <c:pt idx="23">
-                  <c:v>10.303621</c:v>
-                </c:pt>
-                <c:pt idx="24">
-                  <c:v>4.0035449999999999</c:v>
-                </c:pt>
-                <c:pt idx="25">
-                  <c:v>1.6678227000000001</c:v>
-                </c:pt>
-                <c:pt idx="26">
-                  <c:v>3.6541223999999999</c:v>
-                </c:pt>
                 <c:pt idx="27">
-                  <c:v>0.16781840000000001</c:v>
-                </c:pt>
-                <c:pt idx="28">
-                  <c:v>15.840717</c:v>
-                </c:pt>
-                <c:pt idx="29">
-                  <c:v>0.66901140000000003</c:v>
-                </c:pt>
-                <c:pt idx="30">
-                  <c:v>5.4610956000000002E-2</c:v>
-                </c:pt>
-                <c:pt idx="31">
-                  <c:v>1.7845040000000001</c:v>
-                </c:pt>
-                <c:pt idx="32">
-                  <c:v>1.2435944000000001</c:v>
-                </c:pt>
-                <c:pt idx="33">
-                  <c:v>6.6705923</c:v>
-                </c:pt>
-                <c:pt idx="34">
-                  <c:v>7.5165436000000002E-2</c:v>
-                </c:pt>
-                <c:pt idx="35">
-                  <c:v>7.4587700000000003</c:v>
-                </c:pt>
-                <c:pt idx="36">
-                  <c:v>4.7614590000000003</c:v>
-                </c:pt>
-                <c:pt idx="37">
-                  <c:v>0.63111424000000005</c:v>
-                </c:pt>
-                <c:pt idx="38">
-                  <c:v>20.972626000000002</c:v>
-                </c:pt>
-                <c:pt idx="39">
-                  <c:v>4.4084564E-2</c:v>
-                </c:pt>
-                <c:pt idx="40">
-                  <c:v>2.0330138</c:v>
-                </c:pt>
-                <c:pt idx="41">
-                  <c:v>1.9036674</c:v>
-                </c:pt>
-                <c:pt idx="42">
-                  <c:v>2.2179918000000001</c:v>
-                </c:pt>
-                <c:pt idx="43">
-                  <c:v>2.1743185999999999</c:v>
-                </c:pt>
-                <c:pt idx="44">
-                  <c:v>0.83524719999999997</c:v>
-                </c:pt>
-                <c:pt idx="45">
-                  <c:v>10.187163</c:v>
-                </c:pt>
-                <c:pt idx="46">
-                  <c:v>0.71180712999999995</c:v>
-                </c:pt>
-                <c:pt idx="47">
-                  <c:v>16.004549000000001</c:v>
-                </c:pt>
-                <c:pt idx="48">
-                  <c:v>10.820873000000001</c:v>
-                </c:pt>
-                <c:pt idx="49">
-                  <c:v>15.509688000000001</c:v>
-                </c:pt>
-                <c:pt idx="50">
-                  <c:v>1.9813848999999999</c:v>
-                </c:pt>
-                <c:pt idx="51">
-                  <c:v>0.35557538</c:v>
-                </c:pt>
-                <c:pt idx="52">
-                  <c:v>3.2528934</c:v>
+                  <c:v>0.76306668530116795</c:v>
                 </c:pt>
               </c:numCache>
             </c:numRef>
@@ -1215,335 +915,185 @@
           <c:invertIfNegative val="0"/>
           <c:cat>
             <c:strRef>
-              <c:f>Sheet1!$A$2:$A$54</c:f>
+              <c:f>Sheet1!$A$2:$A$29</c:f>
               <c:strCache>
-                <c:ptCount val="53"/>
+                <c:ptCount val="28"/>
                 <c:pt idx="0">
+                  <c:v>bzip2</c:v>
+                </c:pt>
+                <c:pt idx="1">
+                  <c:v>perlbench</c:v>
+                </c:pt>
+                <c:pt idx="2">
+                  <c:v>omnetpp</c:v>
+                </c:pt>
+                <c:pt idx="3">
+                  <c:v>calculix</c:v>
+                </c:pt>
+                <c:pt idx="4">
+                  <c:v>gobmk</c:v>
+                </c:pt>
+                <c:pt idx="5">
+                  <c:v>gcc</c:v>
+                </c:pt>
+                <c:pt idx="6">
+                  <c:v>zeusmp</c:v>
+                </c:pt>
+                <c:pt idx="7">
+                  <c:v>bwaves</c:v>
+                </c:pt>
+                <c:pt idx="8">
+                  <c:v>tonto</c:v>
+                </c:pt>
+                <c:pt idx="9">
+                  <c:v>gromacs</c:v>
+                </c:pt>
+                <c:pt idx="10">
+                  <c:v>astar</c:v>
+                </c:pt>
+                <c:pt idx="11">
+                  <c:v>cactusADM</c:v>
+                </c:pt>
+                <c:pt idx="12">
+                  <c:v>xalancbmk</c:v>
+                </c:pt>
+                <c:pt idx="13">
+                  <c:v>gamess</c:v>
+                </c:pt>
+                <c:pt idx="14">
+                  <c:v>sphinx3</c:v>
+                </c:pt>
+                <c:pt idx="15">
+                  <c:v>milc</c:v>
+                </c:pt>
+                <c:pt idx="16">
+                  <c:v>soplex</c:v>
+                </c:pt>
+                <c:pt idx="17">
+                  <c:v>povray</c:v>
+                </c:pt>
+                <c:pt idx="18">
+                  <c:v>hmmer</c:v>
+                </c:pt>
+                <c:pt idx="19">
+                  <c:v>sjeng</c:v>
+                </c:pt>
+                <c:pt idx="20">
+                  <c:v>libquantum</c:v>
+                </c:pt>
+                <c:pt idx="21">
+                  <c:v>leslie3d</c:v>
+                </c:pt>
+                <c:pt idx="22">
+                  <c:v>wrf</c:v>
+                </c:pt>
+                <c:pt idx="23">
+                  <c:v>namd</c:v>
+                </c:pt>
+                <c:pt idx="24">
                   <c:v>GemsFDTD</c:v>
                 </c:pt>
-                <c:pt idx="1">
-                  <c:v>perlbench_diffmail</c:v>
-                </c:pt>
-                <c:pt idx="2">
-                  <c:v>astar_biglakes</c:v>
-                </c:pt>
-                <c:pt idx="3">
-                  <c:v>bwaves</c:v>
-                </c:pt>
-                <c:pt idx="4">
-                  <c:v>soplex_ref</c:v>
-                </c:pt>
-                <c:pt idx="5">
-                  <c:v>omnetpp</c:v>
-                </c:pt>
-                <c:pt idx="6">
-                  <c:v>gobmk_score2</c:v>
-                </c:pt>
-                <c:pt idx="7">
-                  <c:v>hmmer_retro</c:v>
-                </c:pt>
-                <c:pt idx="8">
-                  <c:v>namd</c:v>
-                </c:pt>
-                <c:pt idx="9">
+                <c:pt idx="25">
+                  <c:v>dealII</c:v>
+                </c:pt>
+                <c:pt idx="26">
                   <c:v>lbm</c:v>
                 </c:pt>
-                <c:pt idx="10">
-                  <c:v>perlbench_splitmail</c:v>
-                </c:pt>
-                <c:pt idx="11">
-                  <c:v>gcc_scilab</c:v>
-                </c:pt>
-                <c:pt idx="12">
-                  <c:v>libquantum</c:v>
-                </c:pt>
-                <c:pt idx="13">
-                  <c:v>cactusADM</c:v>
-                </c:pt>
-                <c:pt idx="14">
-                  <c:v>gcc_166</c:v>
-                </c:pt>
-                <c:pt idx="15">
-                  <c:v>xalancbmk</c:v>
-                </c:pt>
-                <c:pt idx="16">
-                  <c:v>gamess_gradient</c:v>
-                </c:pt>
-                <c:pt idx="17">
-                  <c:v>gcc_s04</c:v>
-                </c:pt>
-                <c:pt idx="18">
-                  <c:v>gobmk_nngs</c:v>
-                </c:pt>
-                <c:pt idx="19">
-                  <c:v>gobmk_trevord</c:v>
-                </c:pt>
-                <c:pt idx="20">
-                  <c:v>h264ref_foreman</c:v>
-                </c:pt>
-                <c:pt idx="21">
-                  <c:v>gamess_triazolium</c:v>
-                </c:pt>
-                <c:pt idx="22">
-                  <c:v>hmmer_nph3</c:v>
-                </c:pt>
-                <c:pt idx="23">
-                  <c:v>bzip2_combined</c:v>
-                </c:pt>
-                <c:pt idx="24">
-                  <c:v>bzip2_html</c:v>
-                </c:pt>
-                <c:pt idx="25">
-                  <c:v>gromacs</c:v>
-                </c:pt>
-                <c:pt idx="26">
-                  <c:v>bzip2_chicken</c:v>
-                </c:pt>
                 <c:pt idx="27">
-                  <c:v>gcc_expr</c:v>
-                </c:pt>
-                <c:pt idx="28">
-                  <c:v>astar_rivers</c:v>
-                </c:pt>
-                <c:pt idx="29">
-                  <c:v>tonto</c:v>
-                </c:pt>
-                <c:pt idx="30">
-                  <c:v>leslie3d</c:v>
-                </c:pt>
-                <c:pt idx="31">
-                  <c:v>gcc_cpdecl</c:v>
-                </c:pt>
-                <c:pt idx="32">
-                  <c:v>gamess_cytosine</c:v>
-                </c:pt>
-                <c:pt idx="33">
-                  <c:v>bzip2_program</c:v>
-                </c:pt>
-                <c:pt idx="34">
-                  <c:v>milc</c:v>
-                </c:pt>
-                <c:pt idx="35">
-                  <c:v>sjeng</c:v>
-                </c:pt>
-                <c:pt idx="36">
-                  <c:v>gcc_200</c:v>
-                </c:pt>
-                <c:pt idx="37">
-                  <c:v>gcc_g23</c:v>
-                </c:pt>
-                <c:pt idx="38">
-                  <c:v>mcf</c:v>
-                </c:pt>
-                <c:pt idx="39">
-                  <c:v>zeusmp</c:v>
-                </c:pt>
-                <c:pt idx="40">
-                  <c:v>bzip2_liberty</c:v>
-                </c:pt>
-                <c:pt idx="41">
-                  <c:v>povray</c:v>
-                </c:pt>
-                <c:pt idx="42">
-                  <c:v>sphinx3</c:v>
-                </c:pt>
-                <c:pt idx="43">
-                  <c:v>gcc_expr2</c:v>
-                </c:pt>
-                <c:pt idx="44">
-                  <c:v>dealII</c:v>
-                </c:pt>
-                <c:pt idx="45">
-                  <c:v>bzip2_source</c:v>
-                </c:pt>
-                <c:pt idx="46">
-                  <c:v>h264ref_sss</c:v>
-                </c:pt>
-                <c:pt idx="47">
-                  <c:v>gobmk_13x13</c:v>
-                </c:pt>
-                <c:pt idx="48">
-                  <c:v>soplex_pds</c:v>
-                </c:pt>
-                <c:pt idx="49">
-                  <c:v>gobmk_trevorc</c:v>
-                </c:pt>
-                <c:pt idx="50">
-                  <c:v>gcc_typeck</c:v>
-                </c:pt>
-                <c:pt idx="51">
-                  <c:v>calculix</c:v>
-                </c:pt>
-                <c:pt idx="52">
-                  <c:v>perlbench_checkspam</c:v>
+                  <c:v>h264ref</c:v>
                 </c:pt>
               </c:strCache>
             </c:strRef>
           </c:cat>
           <c:val>
             <c:numRef>
-              <c:f>Sheet1!$B$2:$B$54</c:f>
+              <c:f>Sheet1!$B$2:$B$29</c:f>
               <c:numCache>
                 <c:formatCode>General</c:formatCode>
-                <c:ptCount val="53"/>
+                <c:ptCount val="28"/>
                 <c:pt idx="0">
+                  <c:v>3.52416652982199</c:v>
+                </c:pt>
+                <c:pt idx="1">
+                  <c:v>0.57473057908474801</c:v>
+                </c:pt>
+                <c:pt idx="2">
+                  <c:v>1.2643872</c:v>
+                </c:pt>
+                <c:pt idx="3">
+                  <c:v>4.4939651999999997E-2</c:v>
+                </c:pt>
+                <c:pt idx="4">
+                  <c:v>5.5977736828609999</c:v>
+                </c:pt>
+                <c:pt idx="5">
+                  <c:v>0.54746692687873999</c:v>
+                </c:pt>
+                <c:pt idx="6">
+                  <c:v>9.4709189999999995E-3</c:v>
+                </c:pt>
+                <c:pt idx="7">
+                  <c:v>1.322536E-3</c:v>
+                </c:pt>
+                <c:pt idx="8">
+                  <c:v>0.25580424000000002</c:v>
+                </c:pt>
+                <c:pt idx="9">
+                  <c:v>3.2775020000000001</c:v>
+                </c:pt>
+                <c:pt idx="10">
+                  <c:v>4.2294844014133002</c:v>
+                </c:pt>
+                <c:pt idx="11">
+                  <c:v>1.2309021</c:v>
+                </c:pt>
+                <c:pt idx="12">
+                  <c:v>0.37385249999999998</c:v>
+                </c:pt>
+                <c:pt idx="13">
+                  <c:v>0.30828509632928303</c:v>
+                </c:pt>
+                <c:pt idx="14">
+                  <c:v>1.5314527</c:v>
+                </c:pt>
+                <c:pt idx="15">
+                  <c:v>1.395969E-2</c:v>
+                </c:pt>
+                <c:pt idx="16">
+                  <c:v>3.18032067813252</c:v>
+                </c:pt>
+                <c:pt idx="17">
+                  <c:v>0.37415648000000001</c:v>
+                </c:pt>
+                <c:pt idx="18">
+                  <c:v>5.3231697383445598</c:v>
+                </c:pt>
+                <c:pt idx="19">
+                  <c:v>2.5065803999999998</c:v>
+                </c:pt>
+                <c:pt idx="20">
+                  <c:v>1.2973706E-2</c:v>
+                </c:pt>
+                <c:pt idx="21">
+                  <c:v>1.0795212E-2</c:v>
+                </c:pt>
+                <c:pt idx="22">
+                  <c:v>0</c:v>
+                </c:pt>
+                <c:pt idx="23">
+                  <c:v>2.5402882</c:v>
+                </c:pt>
+                <c:pt idx="24">
                   <c:v>1.9150550999999998E-2</c:v>
                 </c:pt>
-                <c:pt idx="1">
-                  <c:v>0.18533899000000001</c:v>
-                </c:pt>
-                <c:pt idx="2">
-                  <c:v>2.3524845000000001</c:v>
-                </c:pt>
-                <c:pt idx="3">
-                  <c:v>1.322536E-3</c:v>
-                </c:pt>
-                <c:pt idx="4">
-                  <c:v>1.6574247</c:v>
-                </c:pt>
-                <c:pt idx="5">
-                  <c:v>1.2643872</c:v>
-                </c:pt>
-                <c:pt idx="6">
-                  <c:v>5.0066147000000001</c:v>
-                </c:pt>
-                <c:pt idx="7">
-                  <c:v>5.1928010000000002</c:v>
-                </c:pt>
-                <c:pt idx="8">
-                  <c:v>2.5402882</c:v>
-                </c:pt>
-                <c:pt idx="9">
+                <c:pt idx="25">
+                  <c:v>0.57108959999999998</c:v>
+                </c:pt>
+                <c:pt idx="26">
                   <c:v>0.34893653000000002</c:v>
                 </c:pt>
-                <c:pt idx="10">
-                  <c:v>0.24849450000000001</c:v>
-                </c:pt>
-                <c:pt idx="11">
-                  <c:v>1.7200344000000001</c:v>
-                </c:pt>
-                <c:pt idx="12">
-                  <c:v>1.2973706E-2</c:v>
-                </c:pt>
-                <c:pt idx="13">
-                  <c:v>1.2309021</c:v>
-                </c:pt>
-                <c:pt idx="14">
-                  <c:v>0.33123399999999997</c:v>
-                </c:pt>
-                <c:pt idx="15">
-                  <c:v>0.37385249999999998</c:v>
-                </c:pt>
-                <c:pt idx="16">
-                  <c:v>0.27943414</c:v>
-                </c:pt>
-                <c:pt idx="17">
-                  <c:v>0.36943355</c:v>
-                </c:pt>
-                <c:pt idx="18">
-                  <c:v>5.2998605000000003</c:v>
-                </c:pt>
-                <c:pt idx="19">
-                  <c:v>5.5369289999999998</c:v>
-                </c:pt>
-                <c:pt idx="20">
-                  <c:v>0.84431772999999999</c:v>
-                </c:pt>
-                <c:pt idx="21">
-                  <c:v>0.22988132999999999</c:v>
-                </c:pt>
-                <c:pt idx="22">
-                  <c:v>5.5982250000000002</c:v>
-                </c:pt>
-                <c:pt idx="23">
-                  <c:v>5.4580773999999996</c:v>
-                </c:pt>
-                <c:pt idx="24">
-                  <c:v>2.6305013000000002</c:v>
-                </c:pt>
-                <c:pt idx="25">
-                  <c:v>3.2775020000000001</c:v>
-                </c:pt>
-                <c:pt idx="26">
-                  <c:v>1.9149689999999999</c:v>
-                </c:pt>
                 <c:pt idx="27">
-                  <c:v>2.6563834000000001E-2</c:v>
-                </c:pt>
-                <c:pt idx="28">
-                  <c:v>5.1265745000000003</c:v>
-                </c:pt>
-                <c:pt idx="29">
-                  <c:v>0.25580424000000002</c:v>
-                </c:pt>
-                <c:pt idx="30">
-                  <c:v>1.0795212E-2</c:v>
-                </c:pt>
-                <c:pt idx="31">
-                  <c:v>0.41910934</c:v>
-                </c:pt>
-                <c:pt idx="32">
-                  <c:v>0.4270331</c:v>
-                </c:pt>
-                <c:pt idx="33">
-                  <c:v>3.3886158000000002</c:v>
-                </c:pt>
-                <c:pt idx="34">
-                  <c:v>1.395969E-2</c:v>
-                </c:pt>
-                <c:pt idx="35">
-                  <c:v>2.5065803999999998</c:v>
-                </c:pt>
-                <c:pt idx="36">
-                  <c:v>1.3357724</c:v>
-                </c:pt>
-                <c:pt idx="37">
-                  <c:v>0.14766960000000001</c:v>
-                </c:pt>
-                <c:pt idx="38">
-                  <c:v>4.6170080000000002</c:v>
-                </c:pt>
-                <c:pt idx="39">
-                  <c:v>9.4709189999999995E-3</c:v>
-                </c:pt>
-                <c:pt idx="40">
-                  <c:v>1.0314897999999999</c:v>
-                </c:pt>
-                <c:pt idx="41">
-                  <c:v>0.37415648000000001</c:v>
-                </c:pt>
-                <c:pt idx="42">
-                  <c:v>1.5314527</c:v>
-                </c:pt>
-                <c:pt idx="43">
-                  <c:v>0.62405100000000002</c:v>
-                </c:pt>
-                <c:pt idx="44">
-                  <c:v>0.57108959999999998</c:v>
-                </c:pt>
-                <c:pt idx="45">
-                  <c:v>5.9025464000000003</c:v>
-                </c:pt>
-                <c:pt idx="46">
-                  <c:v>0.60715973000000001</c:v>
-                </c:pt>
-                <c:pt idx="47">
-                  <c:v>6.5972986000000002</c:v>
-                </c:pt>
-                <c:pt idx="48">
-                  <c:v>4.6675430000000002</c:v>
-                </c:pt>
-                <c:pt idx="49">
-                  <c:v>6.2696399999999999</c:v>
-                </c:pt>
-                <c:pt idx="50">
-                  <c:v>0.51320330000000003</c:v>
-                </c:pt>
-                <c:pt idx="51">
-                  <c:v>4.4939651999999997E-2</c:v>
-                </c:pt>
-                <c:pt idx="52">
-                  <c:v>0.91089719999999996</c:v>
+                  <c:v>0.630538302028117</c:v>
                 </c:pt>
               </c:numCache>
             </c:numRef>
@@ -1580,335 +1130,185 @@
           <c:invertIfNegative val="0"/>
           <c:cat>
             <c:strRef>
-              <c:f>Sheet1!$A$2:$A$54</c:f>
+              <c:f>Sheet1!$A$2:$A$29</c:f>
               <c:strCache>
-                <c:ptCount val="53"/>
+                <c:ptCount val="28"/>
                 <c:pt idx="0">
+                  <c:v>bzip2</c:v>
+                </c:pt>
+                <c:pt idx="1">
+                  <c:v>perlbench</c:v>
+                </c:pt>
+                <c:pt idx="2">
+                  <c:v>omnetpp</c:v>
+                </c:pt>
+                <c:pt idx="3">
+                  <c:v>calculix</c:v>
+                </c:pt>
+                <c:pt idx="4">
+                  <c:v>gobmk</c:v>
+                </c:pt>
+                <c:pt idx="5">
+                  <c:v>gcc</c:v>
+                </c:pt>
+                <c:pt idx="6">
+                  <c:v>zeusmp</c:v>
+                </c:pt>
+                <c:pt idx="7">
+                  <c:v>bwaves</c:v>
+                </c:pt>
+                <c:pt idx="8">
+                  <c:v>tonto</c:v>
+                </c:pt>
+                <c:pt idx="9">
+                  <c:v>gromacs</c:v>
+                </c:pt>
+                <c:pt idx="10">
+                  <c:v>astar</c:v>
+                </c:pt>
+                <c:pt idx="11">
+                  <c:v>cactusADM</c:v>
+                </c:pt>
+                <c:pt idx="12">
+                  <c:v>xalancbmk</c:v>
+                </c:pt>
+                <c:pt idx="13">
+                  <c:v>gamess</c:v>
+                </c:pt>
+                <c:pt idx="14">
+                  <c:v>sphinx3</c:v>
+                </c:pt>
+                <c:pt idx="15">
+                  <c:v>milc</c:v>
+                </c:pt>
+                <c:pt idx="16">
+                  <c:v>soplex</c:v>
+                </c:pt>
+                <c:pt idx="17">
+                  <c:v>povray</c:v>
+                </c:pt>
+                <c:pt idx="18">
+                  <c:v>hmmer</c:v>
+                </c:pt>
+                <c:pt idx="19">
+                  <c:v>sjeng</c:v>
+                </c:pt>
+                <c:pt idx="20">
+                  <c:v>libquantum</c:v>
+                </c:pt>
+                <c:pt idx="21">
+                  <c:v>leslie3d</c:v>
+                </c:pt>
+                <c:pt idx="22">
+                  <c:v>wrf</c:v>
+                </c:pt>
+                <c:pt idx="23">
+                  <c:v>namd</c:v>
+                </c:pt>
+                <c:pt idx="24">
                   <c:v>GemsFDTD</c:v>
                 </c:pt>
-                <c:pt idx="1">
-                  <c:v>perlbench_diffmail</c:v>
-                </c:pt>
-                <c:pt idx="2">
-                  <c:v>astar_biglakes</c:v>
-                </c:pt>
-                <c:pt idx="3">
-                  <c:v>bwaves</c:v>
-                </c:pt>
-                <c:pt idx="4">
-                  <c:v>soplex_ref</c:v>
-                </c:pt>
-                <c:pt idx="5">
-                  <c:v>omnetpp</c:v>
-                </c:pt>
-                <c:pt idx="6">
-                  <c:v>gobmk_score2</c:v>
-                </c:pt>
-                <c:pt idx="7">
-                  <c:v>hmmer_retro</c:v>
-                </c:pt>
-                <c:pt idx="8">
-                  <c:v>namd</c:v>
-                </c:pt>
-                <c:pt idx="9">
+                <c:pt idx="25">
+                  <c:v>dealII</c:v>
+                </c:pt>
+                <c:pt idx="26">
                   <c:v>lbm</c:v>
                 </c:pt>
-                <c:pt idx="10">
-                  <c:v>perlbench_splitmail</c:v>
-                </c:pt>
-                <c:pt idx="11">
-                  <c:v>gcc_scilab</c:v>
-                </c:pt>
-                <c:pt idx="12">
-                  <c:v>libquantum</c:v>
-                </c:pt>
-                <c:pt idx="13">
-                  <c:v>cactusADM</c:v>
-                </c:pt>
-                <c:pt idx="14">
-                  <c:v>gcc_166</c:v>
-                </c:pt>
-                <c:pt idx="15">
-                  <c:v>xalancbmk</c:v>
-                </c:pt>
-                <c:pt idx="16">
-                  <c:v>gamess_gradient</c:v>
-                </c:pt>
-                <c:pt idx="17">
-                  <c:v>gcc_s04</c:v>
-                </c:pt>
-                <c:pt idx="18">
-                  <c:v>gobmk_nngs</c:v>
-                </c:pt>
-                <c:pt idx="19">
-                  <c:v>gobmk_trevord</c:v>
-                </c:pt>
-                <c:pt idx="20">
-                  <c:v>h264ref_foreman</c:v>
-                </c:pt>
-                <c:pt idx="21">
-                  <c:v>gamess_triazolium</c:v>
-                </c:pt>
-                <c:pt idx="22">
-                  <c:v>hmmer_nph3</c:v>
-                </c:pt>
-                <c:pt idx="23">
-                  <c:v>bzip2_combined</c:v>
-                </c:pt>
-                <c:pt idx="24">
-                  <c:v>bzip2_html</c:v>
-                </c:pt>
-                <c:pt idx="25">
-                  <c:v>gromacs</c:v>
-                </c:pt>
-                <c:pt idx="26">
-                  <c:v>bzip2_chicken</c:v>
-                </c:pt>
                 <c:pt idx="27">
-                  <c:v>gcc_expr</c:v>
-                </c:pt>
-                <c:pt idx="28">
-                  <c:v>astar_rivers</c:v>
-                </c:pt>
-                <c:pt idx="29">
-                  <c:v>tonto</c:v>
-                </c:pt>
-                <c:pt idx="30">
-                  <c:v>leslie3d</c:v>
-                </c:pt>
-                <c:pt idx="31">
-                  <c:v>gcc_cpdecl</c:v>
-                </c:pt>
-                <c:pt idx="32">
-                  <c:v>gamess_cytosine</c:v>
-                </c:pt>
-                <c:pt idx="33">
-                  <c:v>bzip2_program</c:v>
-                </c:pt>
-                <c:pt idx="34">
-                  <c:v>milc</c:v>
-                </c:pt>
-                <c:pt idx="35">
-                  <c:v>sjeng</c:v>
-                </c:pt>
-                <c:pt idx="36">
-                  <c:v>gcc_200</c:v>
-                </c:pt>
-                <c:pt idx="37">
-                  <c:v>gcc_g23</c:v>
-                </c:pt>
-                <c:pt idx="38">
-                  <c:v>mcf</c:v>
-                </c:pt>
-                <c:pt idx="39">
-                  <c:v>zeusmp</c:v>
-                </c:pt>
-                <c:pt idx="40">
-                  <c:v>bzip2_liberty</c:v>
-                </c:pt>
-                <c:pt idx="41">
-                  <c:v>povray</c:v>
-                </c:pt>
-                <c:pt idx="42">
-                  <c:v>sphinx3</c:v>
-                </c:pt>
-                <c:pt idx="43">
-                  <c:v>gcc_expr2</c:v>
-                </c:pt>
-                <c:pt idx="44">
-                  <c:v>dealII</c:v>
-                </c:pt>
-                <c:pt idx="45">
-                  <c:v>bzip2_source</c:v>
-                </c:pt>
-                <c:pt idx="46">
-                  <c:v>h264ref_sss</c:v>
-                </c:pt>
-                <c:pt idx="47">
-                  <c:v>gobmk_13x13</c:v>
-                </c:pt>
-                <c:pt idx="48">
-                  <c:v>soplex_pds</c:v>
-                </c:pt>
-                <c:pt idx="49">
-                  <c:v>gobmk_trevorc</c:v>
-                </c:pt>
-                <c:pt idx="50">
-                  <c:v>gcc_typeck</c:v>
-                </c:pt>
-                <c:pt idx="51">
-                  <c:v>calculix</c:v>
-                </c:pt>
-                <c:pt idx="52">
-                  <c:v>perlbench_checkspam</c:v>
+                  <c:v>h264ref</c:v>
                 </c:pt>
               </c:strCache>
             </c:strRef>
           </c:cat>
           <c:val>
             <c:numRef>
-              <c:f>Sheet1!$C$2:$C$54</c:f>
+              <c:f>Sheet1!$C$2:$C$29</c:f>
               <c:numCache>
                 <c:formatCode>General</c:formatCode>
-                <c:ptCount val="53"/>
+                <c:ptCount val="28"/>
                 <c:pt idx="0">
+                  <c:v>2.51010837864253</c:v>
+                </c:pt>
+                <c:pt idx="1">
+                  <c:v>0.63363216495483898</c:v>
+                </c:pt>
+                <c:pt idx="2">
+                  <c:v>1.209592</c:v>
+                </c:pt>
+                <c:pt idx="3">
+                  <c:v>0.26009633999999998</c:v>
+                </c:pt>
+                <c:pt idx="4">
+                  <c:v>4.7584778028770502</c:v>
+                </c:pt>
+                <c:pt idx="5">
+                  <c:v>0.52147678595369196</c:v>
+                </c:pt>
+                <c:pt idx="6">
+                  <c:v>9.2442683999999997E-2</c:v>
+                </c:pt>
+                <c:pt idx="7">
+                  <c:v>0.10315781</c:v>
+                </c:pt>
+                <c:pt idx="8">
+                  <c:v>0.41064715000000002</c:v>
+                </c:pt>
+                <c:pt idx="9">
+                  <c:v>1.9424782</c:v>
+                </c:pt>
+                <c:pt idx="10">
+                  <c:v>3.9269763719573101</c:v>
+                </c:pt>
+                <c:pt idx="11">
+                  <c:v>0.2768294</c:v>
+                </c:pt>
+                <c:pt idx="12">
+                  <c:v>0.31331098000000002</c:v>
+                </c:pt>
+                <c:pt idx="13">
+                  <c:v>0.57017105023808701</c:v>
+                </c:pt>
+                <c:pt idx="14">
+                  <c:v>1.2651920000000001</c:v>
+                </c:pt>
+                <c:pt idx="15">
+                  <c:v>5.7646629999999997E-2</c:v>
+                </c:pt>
+                <c:pt idx="16">
+                  <c:v>2.4207688831805698</c:v>
+                </c:pt>
+                <c:pt idx="17">
+                  <c:v>0.67883919999999998</c:v>
+                </c:pt>
+                <c:pt idx="18">
+                  <c:v>4.6268154148786698</c:v>
+                </c:pt>
+                <c:pt idx="19">
+                  <c:v>2.2046429999999999</c:v>
+                </c:pt>
+                <c:pt idx="20">
+                  <c:v>3.1123343000000001E-3</c:v>
+                </c:pt>
+                <c:pt idx="21">
+                  <c:v>4.5779581999999999E-2</c:v>
+                </c:pt>
+                <c:pt idx="22">
+                  <c:v>0</c:v>
+                </c:pt>
+                <c:pt idx="23">
+                  <c:v>1.8129896000000001</c:v>
+                </c:pt>
+                <c:pt idx="24">
                   <c:v>0.23388094000000001</c:v>
                 </c:pt>
-                <c:pt idx="1">
-                  <c:v>0.264936</c:v>
-                </c:pt>
-                <c:pt idx="2">
-                  <c:v>2.5353916000000001</c:v>
-                </c:pt>
-                <c:pt idx="3">
-                  <c:v>0.10315781</c:v>
-                </c:pt>
-                <c:pt idx="4">
-                  <c:v>1.4633267999999999</c:v>
-                </c:pt>
-                <c:pt idx="5">
-                  <c:v>1.209592</c:v>
-                </c:pt>
-                <c:pt idx="6">
-                  <c:v>4.3229509999999998</c:v>
-                </c:pt>
-                <c:pt idx="7">
-                  <c:v>4.4920964000000003</c:v>
-                </c:pt>
-                <c:pt idx="8">
-                  <c:v>1.8129896000000001</c:v>
-                </c:pt>
-                <c:pt idx="9">
+                <c:pt idx="25">
+                  <c:v>0.44196187999999997</c:v>
+                </c:pt>
+                <c:pt idx="26">
                   <c:v>0.22779237999999999</c:v>
                 </c:pt>
-                <c:pt idx="10">
-                  <c:v>0.30507951999999999</c:v>
-                </c:pt>
-                <c:pt idx="11">
-                  <c:v>0.95083105999999995</c:v>
-                </c:pt>
-                <c:pt idx="12">
-                  <c:v>3.1123343000000001E-3</c:v>
-                </c:pt>
-                <c:pt idx="13">
-                  <c:v>0.2768294</c:v>
-                </c:pt>
-                <c:pt idx="14">
-                  <c:v>0.39143403999999998</c:v>
-                </c:pt>
-                <c:pt idx="15">
-                  <c:v>0.31331098000000002</c:v>
-                </c:pt>
-                <c:pt idx="16">
-                  <c:v>0.49609908000000003</c:v>
-                </c:pt>
-                <c:pt idx="17">
-                  <c:v>0.43125724999999998</c:v>
-                </c:pt>
-                <c:pt idx="18">
-                  <c:v>4.6523924000000001</c:v>
-                </c:pt>
-                <c:pt idx="19">
-                  <c:v>4.5940539999999999</c:v>
-                </c:pt>
-                <c:pt idx="20">
-                  <c:v>0.78198100000000004</c:v>
-                </c:pt>
-                <c:pt idx="21">
-                  <c:v>0.37028601999999999</c:v>
-                </c:pt>
-                <c:pt idx="22">
-                  <c:v>4.9110490000000002</c:v>
-                </c:pt>
-                <c:pt idx="23">
-                  <c:v>3.9751356000000002</c:v>
-                </c:pt>
-                <c:pt idx="24">
-                  <c:v>1.8673251</c:v>
-                </c:pt>
-                <c:pt idx="25">
-                  <c:v>1.9424782</c:v>
-                </c:pt>
-                <c:pt idx="26">
-                  <c:v>1.2812271</c:v>
-                </c:pt>
                 <c:pt idx="27">
-                  <c:v>3.5262710000000003E-2</c:v>
-                </c:pt>
-                <c:pt idx="28">
-                  <c:v>4.5920680000000003</c:v>
-                </c:pt>
-                <c:pt idx="29">
-                  <c:v>0.41064715000000002</c:v>
-                </c:pt>
-                <c:pt idx="30">
-                  <c:v>4.5779581999999999E-2</c:v>
-                </c:pt>
-                <c:pt idx="31">
-                  <c:v>0.51758000000000004</c:v>
-                </c:pt>
-                <c:pt idx="32">
-                  <c:v>0.87466259999999996</c:v>
-                </c:pt>
-                <c:pt idx="33">
-                  <c:v>2.5162108000000001</c:v>
-                </c:pt>
-                <c:pt idx="34">
-                  <c:v>5.7646629999999997E-2</c:v>
-                </c:pt>
-                <c:pt idx="35">
-                  <c:v>2.2046429999999999</c:v>
-                </c:pt>
-                <c:pt idx="36">
-                  <c:v>1.1853541999999999</c:v>
-                </c:pt>
-                <c:pt idx="37">
-                  <c:v>0.22359499999999999</c:v>
-                </c:pt>
-                <c:pt idx="38">
-                  <c:v>4.2991149999999996</c:v>
-                </c:pt>
-                <c:pt idx="39">
-                  <c:v>9.2442683999999997E-2</c:v>
-                </c:pt>
-                <c:pt idx="40">
-                  <c:v>0.64034926999999997</c:v>
-                </c:pt>
-                <c:pt idx="41">
-                  <c:v>0.67883919999999998</c:v>
-                </c:pt>
-                <c:pt idx="42">
-                  <c:v>1.2651920000000001</c:v>
-                </c:pt>
-                <c:pt idx="43">
-                  <c:v>0.59007186</c:v>
-                </c:pt>
-                <c:pt idx="44">
-                  <c:v>0.44196187999999997</c:v>
-                </c:pt>
-                <c:pt idx="45">
-                  <c:v>4.1165599999999998</c:v>
-                </c:pt>
-                <c:pt idx="46">
-                  <c:v>0.53349360000000001</c:v>
-                </c:pt>
-                <c:pt idx="47">
-                  <c:v>5.1299510000000001</c:v>
-                </c:pt>
-                <c:pt idx="48">
-                  <c:v>3.3557830000000002</c:v>
-                </c:pt>
-                <c:pt idx="49">
-                  <c:v>5.4847783999999997</c:v>
-                </c:pt>
-                <c:pt idx="50">
-                  <c:v>0.52764440000000001</c:v>
-                </c:pt>
-                <c:pt idx="51">
-                  <c:v>0.26009633999999998</c:v>
-                </c:pt>
-                <c:pt idx="52">
-                  <c:v>0.96364839999999996</c:v>
+                  <c:v>0.557989002132669</c:v>
                 </c:pt>
               </c:numCache>
             </c:numRef>
@@ -6425,7 +5825,7 @@
           <p:nvPr>
             <p:extLst>
               <p:ext uri="{D42A27DB-BD31-4B8C-83A1-F6EECF244321}">
-                <p14:modId xmlns:p14="http://schemas.microsoft.com/office/powerpoint/2010/main" val="3414132468"/>
+                <p14:modId xmlns:p14="http://schemas.microsoft.com/office/powerpoint/2010/main" val="1458674157"/>
               </p:ext>
             </p:extLst>
           </p:nvPr>
@@ -6483,7 +5883,7 @@
           <p:nvPr>
             <p:extLst>
               <p:ext uri="{D42A27DB-BD31-4B8C-83A1-F6EECF244321}">
-                <p14:modId xmlns:p14="http://schemas.microsoft.com/office/powerpoint/2010/main" val="3954930242"/>
+                <p14:modId xmlns:p14="http://schemas.microsoft.com/office/powerpoint/2010/main" val="2087069110"/>
               </p:ext>
             </p:extLst>
           </p:nvPr>

</xml_diff>